<commit_message>
ESP32 C3 mini pinout
</commit_message>
<xml_diff>
--- a/Eléments de programmation.pptx
+++ b/Eléments de programmation.pptx
@@ -14,13 +14,11 @@
     <p:sldId id="262" r:id="rId8"/>
     <p:sldId id="263" r:id="rId9"/>
     <p:sldId id="264" r:id="rId10"/>
-    <p:sldId id="265" r:id="rId11"/>
+    <p:sldId id="272" r:id="rId11"/>
     <p:sldId id="266" r:id="rId12"/>
-    <p:sldId id="267" r:id="rId13"/>
-    <p:sldId id="270" r:id="rId14"/>
-    <p:sldId id="268" r:id="rId15"/>
-    <p:sldId id="269" r:id="rId16"/>
-    <p:sldId id="271" r:id="rId17"/>
+    <p:sldId id="273" r:id="rId13"/>
+    <p:sldId id="274" r:id="rId14"/>
+    <p:sldId id="275" r:id="rId15"/>
   </p:sldIdLst>
   <p:sldSz cx="12192000" cy="6858000"/>
   <p:notesSz cx="6858000" cy="9144000"/>
@@ -463,7 +461,7 @@
             <a:fld id="{5923F103-BC34-4FE4-A40E-EDDEECFDA5D0}" type="datetimeFigureOut">
               <a:rPr lang="en-US" dirty="0"/>
               <a:pPr/>
-              <a:t>10/29/2024</a:t>
+              <a:t>11/14/2024</a:t>
             </a:fld>
             <a:endParaRPr lang="en-US" dirty="0"/>
           </a:p>
@@ -1547,7 +1545,7 @@
           <a:p>
             <a:fld id="{923A1CC3-2375-41D4-9E03-427CAF2A4C1A}" type="datetimeFigureOut">
               <a:rPr lang="en-US" dirty="0"/>
-              <a:t>10/29/2024</a:t>
+              <a:t>11/14/2024</a:t>
             </a:fld>
             <a:endParaRPr lang="en-US" dirty="0"/>
           </a:p>
@@ -2523,7 +2521,7 @@
           <a:p>
             <a:fld id="{AFF16868-8199-4C2C-A5B1-63AEE139F88E}" type="datetimeFigureOut">
               <a:rPr lang="en-US" dirty="0"/>
-              <a:t>10/29/2024</a:t>
+              <a:t>11/14/2024</a:t>
             </a:fld>
             <a:endParaRPr lang="en-US" dirty="0"/>
           </a:p>
@@ -3653,7 +3651,7 @@
           <a:p>
             <a:fld id="{AAD9FF7F-6988-44CC-821B-644E70CD2F73}" type="datetimeFigureOut">
               <a:rPr lang="en-US" dirty="0"/>
-              <a:t>10/29/2024</a:t>
+              <a:t>11/14/2024</a:t>
             </a:fld>
             <a:endParaRPr lang="en-US" dirty="0"/>
           </a:p>
@@ -4682,7 +4680,7 @@
           <a:p>
             <a:fld id="{5C12C299-16B2-4475-990D-751901EACC14}" type="datetimeFigureOut">
               <a:rPr lang="en-US" dirty="0"/>
-              <a:t>10/29/2024</a:t>
+              <a:t>11/14/2024</a:t>
             </a:fld>
             <a:endParaRPr lang="en-US" dirty="0"/>
           </a:p>
@@ -5338,7 +5336,7 @@
           <a:p>
             <a:fld id="{9FE86839-B9D8-4651-8783-F325ECE74E65}" type="datetimeFigureOut">
               <a:rPr lang="en-US" dirty="0"/>
-              <a:t>10/29/2024</a:t>
+              <a:t>11/14/2024</a:t>
             </a:fld>
             <a:endParaRPr lang="en-US" dirty="0"/>
           </a:p>
@@ -6195,7 +6193,7 @@
           <a:p>
             <a:fld id="{FD484F64-32F6-45C5-931F-ADC1662401D0}" type="datetimeFigureOut">
               <a:rPr lang="en-US" dirty="0"/>
-              <a:t>10/29/2024</a:t>
+              <a:t>11/14/2024</a:t>
             </a:fld>
             <a:endParaRPr lang="en-US" dirty="0"/>
           </a:p>
@@ -6381,7 +6379,7 @@
           <a:p>
             <a:fld id="{53086D93-FCAC-47E0-A2EE-787E62CA814C}" type="datetimeFigureOut">
               <a:rPr lang="en-US" dirty="0"/>
-              <a:t>10/29/2024</a:t>
+              <a:t>11/14/2024</a:t>
             </a:fld>
             <a:endParaRPr lang="en-US" dirty="0"/>
           </a:p>
@@ -7349,7 +7347,7 @@
           <a:p>
             <a:fld id="{CDA879A6-0FD0-4734-A311-86BFCA472E6E}" type="datetimeFigureOut">
               <a:rPr lang="en-US" dirty="0"/>
-              <a:t>10/29/2024</a:t>
+              <a:t>11/14/2024</a:t>
             </a:fld>
             <a:endParaRPr lang="en-US" dirty="0"/>
           </a:p>
@@ -7556,7 +7554,7 @@
           <a:p>
             <a:fld id="{19C9CA7B-DFD4-44B5-8C60-D14B8CD1FB59}" type="datetimeFigureOut">
               <a:rPr lang="en-US" dirty="0"/>
-              <a:t>10/29/2024</a:t>
+              <a:t>11/14/2024</a:t>
             </a:fld>
             <a:endParaRPr lang="en-US" dirty="0"/>
           </a:p>
@@ -8586,7 +8584,7 @@
           <a:p>
             <a:fld id="{F34E6425-0181-43F2-84FC-787E803FD2F8}" type="datetimeFigureOut">
               <a:rPr lang="en-US" dirty="0"/>
-              <a:t>10/29/2024</a:t>
+              <a:t>11/14/2024</a:t>
             </a:fld>
             <a:endParaRPr lang="en-US" dirty="0"/>
           </a:p>
@@ -8854,7 +8852,7 @@
           <a:p>
             <a:fld id="{3BDB8791-F1B0-41E7-B7FD-A781E65C4266}" type="datetimeFigureOut">
               <a:rPr lang="en-US" dirty="0"/>
-              <a:t>10/29/2024</a:t>
+              <a:t>11/14/2024</a:t>
             </a:fld>
             <a:endParaRPr lang="en-US" dirty="0"/>
           </a:p>
@@ -9260,7 +9258,7 @@
           <a:p>
             <a:fld id="{5FDD63B2-E120-4ED8-B27B-C685F510A5FE}" type="datetimeFigureOut">
               <a:rPr lang="en-US" dirty="0"/>
-              <a:t>10/29/2024</a:t>
+              <a:t>11/14/2024</a:t>
             </a:fld>
             <a:endParaRPr lang="en-US" dirty="0"/>
           </a:p>
@@ -9383,7 +9381,7 @@
           <a:p>
             <a:fld id="{7AA18ACC-A947-437B-A130-35BD54FDF1E9}" type="datetimeFigureOut">
               <a:rPr lang="en-US" dirty="0"/>
-              <a:t>10/29/2024</a:t>
+              <a:t>11/14/2024</a:t>
             </a:fld>
             <a:endParaRPr lang="en-US" dirty="0"/>
           </a:p>
@@ -9474,7 +9472,7 @@
           <a:p>
             <a:fld id="{7C8D7E02-BCB8-4D50-A234-369438C08659}" type="datetimeFigureOut">
               <a:rPr lang="en-US" dirty="0"/>
-              <a:t>10/29/2024</a:t>
+              <a:t>11/14/2024</a:t>
             </a:fld>
             <a:endParaRPr lang="en-US" dirty="0"/>
           </a:p>
@@ -10551,7 +10549,7 @@
           <a:p>
             <a:fld id="{76E86A4C-8E40-4F87-A4F0-01A0687C5742}" type="datetimeFigureOut">
               <a:rPr lang="en-US" dirty="0"/>
-              <a:t>10/29/2024</a:t>
+              <a:t>11/14/2024</a:t>
             </a:fld>
             <a:endParaRPr lang="en-US" dirty="0"/>
           </a:p>
@@ -11655,7 +11653,7 @@
           <a:p>
             <a:fld id="{35E72C73-2D91-4E12-BA25-F0AA0C03599B}" type="datetimeFigureOut">
               <a:rPr lang="en-US" dirty="0"/>
-              <a:t>10/29/2024</a:t>
+              <a:t>11/14/2024</a:t>
             </a:fld>
             <a:endParaRPr lang="en-US" dirty="0"/>
           </a:p>
@@ -12648,7 +12646,7 @@
           <a:p>
             <a:fld id="{2BE451C3-0FF4-47C4-B829-773ADF60F88C}" type="datetimeFigureOut">
               <a:rPr lang="en-US" dirty="0"/>
-              <a:t>10/29/2024</a:t>
+              <a:t>11/14/2024</a:t>
             </a:fld>
             <a:endParaRPr lang="en-US" dirty="0"/>
           </a:p>
@@ -13266,6 +13264,12 @@
 <file path=ppt/slides/slide10.xml><?xml version="1.0" encoding="utf-8"?>
 <p:sld xmlns:a="http://schemas.openxmlformats.org/drawingml/2006/main" xmlns:r="http://schemas.openxmlformats.org/officeDocument/2006/relationships" xmlns:p="http://schemas.openxmlformats.org/presentationml/2006/main">
   <p:cSld>
+    <p:bg>
+      <p:bgPr>
+        <a:noFill/>
+        <a:effectLst/>
+      </p:bgPr>
+    </p:bg>
     <p:spTree>
       <p:nvGrpSpPr>
         <p:cNvPr id="1" name=""/>
@@ -13297,7 +13301,7 @@
           <a:p>
             <a:r>
               <a:rPr lang="fr-FR" dirty="0" smtClean="0"/>
-              <a:t>Concepts de base</a:t>
+              <a:t>Python et autres docs</a:t>
             </a:r>
             <a:endParaRPr lang="fr-FR" dirty="0"/>
           </a:p>
@@ -13313,53 +13317,239 @@
             <p:ph idx="1"/>
           </p:nvPr>
         </p:nvSpPr>
-        <p:spPr/>
+        <p:spPr>
+          <a:xfrm>
+            <a:off x="1154955" y="2603500"/>
+            <a:ext cx="6679229" cy="3416300"/>
+          </a:xfrm>
+        </p:spPr>
         <p:txBody>
           <a:bodyPr/>
           <a:lstStyle/>
           <a:p>
             <a:r>
               <a:rPr lang="fr-FR" dirty="0" smtClean="0"/>
-              <a:t>Types</a:t>
-            </a:r>
-          </a:p>
-          <a:p>
+              <a:t>La </a:t>
+            </a:r>
+            <a:r>
+              <a:rPr lang="fr-FR" dirty="0"/>
+              <a:t>documentation officielle est </a:t>
+            </a:r>
             <a:r>
               <a:rPr lang="fr-FR" dirty="0" smtClean="0"/>
-              <a:t>Données</a:t>
-            </a:r>
+              <a:t>la plus efficace</a:t>
+            </a:r>
+          </a:p>
+          <a:p>
+            <a:endParaRPr lang="fr-FR" dirty="0"/>
+          </a:p>
+          <a:p>
+            <a:r>
+              <a:rPr lang="fr-FR" dirty="0" err="1" smtClean="0"/>
+              <a:t>Micropython</a:t>
+            </a:r>
+            <a:endParaRPr lang="fr-FR" dirty="0" smtClean="0"/>
+          </a:p>
+          <a:p>
+            <a:endParaRPr lang="fr-FR" dirty="0" smtClean="0"/>
           </a:p>
           <a:p>
             <a:r>
               <a:rPr lang="fr-FR" dirty="0" smtClean="0"/>
-              <a:t>Opérateurs</a:t>
-            </a:r>
-          </a:p>
-          <a:p>
+              <a:t>ESP32 </a:t>
+            </a:r>
+            <a:r>
+              <a:rPr lang="fr-FR" dirty="0" err="1" smtClean="0"/>
+              <a:t>series</a:t>
+            </a:r>
+            <a:endParaRPr lang="fr-FR" dirty="0" smtClean="0"/>
+          </a:p>
+          <a:p>
+            <a:endParaRPr lang="fr-FR" dirty="0"/>
+          </a:p>
+          <a:p>
+            <a:r>
+              <a:rPr lang="fr-FR" dirty="0" err="1" smtClean="0"/>
+              <a:t>Micropython</a:t>
+            </a:r>
             <a:r>
               <a:rPr lang="fr-FR" dirty="0" smtClean="0"/>
-              <a:t>Fonctions</a:t>
-            </a:r>
-          </a:p>
-          <a:p>
-            <a:r>
-              <a:rPr lang="fr-FR" dirty="0" smtClean="0"/>
-              <a:t>Structures logiques et de décision</a:t>
-            </a:r>
-          </a:p>
-          <a:p>
-            <a:r>
-              <a:rPr lang="fr-FR" dirty="0" smtClean="0"/>
-              <a:t>Structure organisationnelles</a:t>
-            </a:r>
-            <a:endParaRPr lang="fr-FR" dirty="0"/>
+              <a:t> et ESP-NOW</a:t>
+            </a:r>
+          </a:p>
+          <a:p>
+            <a:endParaRPr lang="fr-FR" dirty="0" smtClean="0"/>
+          </a:p>
+        </p:txBody>
+      </p:sp>
+      <p:sp>
+        <p:nvSpPr>
+          <p:cNvPr id="20" name="ZoneTexte 19"/>
+          <p:cNvSpPr txBox="1"/>
+          <p:nvPr/>
+        </p:nvSpPr>
+        <p:spPr>
+          <a:xfrm>
+            <a:off x="2306593" y="3039762"/>
+            <a:ext cx="5192447" cy="369332"/>
+          </a:xfrm>
+          <a:prstGeom prst="rect">
+            <a:avLst/>
+          </a:prstGeom>
+          <a:solidFill>
+            <a:schemeClr val="bg1">
+              <a:lumMod val="85000"/>
+            </a:schemeClr>
+          </a:solidFill>
+          <a:ln w="28575">
+            <a:solidFill>
+              <a:srgbClr val="FF0000"/>
+            </a:solidFill>
+          </a:ln>
+        </p:spPr>
+        <p:txBody>
+          <a:bodyPr wrap="none" rtlCol="0">
+            <a:spAutoFit/>
+          </a:bodyPr>
+          <a:lstStyle/>
+          <a:p>
+            <a:r>
+              <a:rPr lang="fr-FR" dirty="0"/>
+              <a:t>https://docs.python.org/3/tutorial/index.html</a:t>
+            </a:r>
+          </a:p>
+        </p:txBody>
+      </p:sp>
+      <p:sp>
+        <p:nvSpPr>
+          <p:cNvPr id="21" name="ZoneTexte 20"/>
+          <p:cNvSpPr txBox="1"/>
+          <p:nvPr/>
+        </p:nvSpPr>
+        <p:spPr>
+          <a:xfrm>
+            <a:off x="2281882" y="4646140"/>
+            <a:ext cx="5674951" cy="369332"/>
+          </a:xfrm>
+          <a:prstGeom prst="rect">
+            <a:avLst/>
+          </a:prstGeom>
+          <a:solidFill>
+            <a:schemeClr val="bg1">
+              <a:lumMod val="85000"/>
+            </a:schemeClr>
+          </a:solidFill>
+          <a:ln w="28575">
+            <a:solidFill>
+              <a:srgbClr val="FF0000"/>
+            </a:solidFill>
+          </a:ln>
+        </p:spPr>
+        <p:txBody>
+          <a:bodyPr wrap="none" rtlCol="0">
+            <a:spAutoFit/>
+          </a:bodyPr>
+          <a:lstStyle>
+            <a:defPPr>
+              <a:defRPr lang="en-US"/>
+            </a:defPPr>
+          </a:lstStyle>
+          <a:p>
+            <a:r>
+              <a:rPr lang="fr-FR" dirty="0"/>
+              <a:t>https://www.espressif.com/en/products/modules</a:t>
+            </a:r>
+          </a:p>
+        </p:txBody>
+      </p:sp>
+      <p:sp>
+        <p:nvSpPr>
+          <p:cNvPr id="22" name="ZoneTexte 21"/>
+          <p:cNvSpPr txBox="1"/>
+          <p:nvPr/>
+        </p:nvSpPr>
+        <p:spPr>
+          <a:xfrm>
+            <a:off x="2306594" y="3830595"/>
+            <a:ext cx="7444667" cy="369332"/>
+          </a:xfrm>
+          <a:prstGeom prst="rect">
+            <a:avLst/>
+          </a:prstGeom>
+          <a:solidFill>
+            <a:schemeClr val="bg1">
+              <a:lumMod val="85000"/>
+            </a:schemeClr>
+          </a:solidFill>
+          <a:ln w="28575">
+            <a:solidFill>
+              <a:srgbClr val="FF0000"/>
+            </a:solidFill>
+          </a:ln>
+        </p:spPr>
+        <p:txBody>
+          <a:bodyPr wrap="none" rtlCol="0">
+            <a:spAutoFit/>
+          </a:bodyPr>
+          <a:lstStyle>
+            <a:defPPr>
+              <a:defRPr lang="en-US"/>
+            </a:defPPr>
+          </a:lstStyle>
+          <a:p>
+            <a:r>
+              <a:rPr lang="fr-FR" dirty="0"/>
+              <a:t>https://docs.micropython.org/en/latest/esp32/tutorial/index.html</a:t>
+            </a:r>
+          </a:p>
+        </p:txBody>
+      </p:sp>
+      <p:sp>
+        <p:nvSpPr>
+          <p:cNvPr id="23" name="ZoneTexte 22"/>
+          <p:cNvSpPr txBox="1"/>
+          <p:nvPr/>
+        </p:nvSpPr>
+        <p:spPr>
+          <a:xfrm>
+            <a:off x="2248929" y="5412258"/>
+            <a:ext cx="8853706" cy="369332"/>
+          </a:xfrm>
+          <a:prstGeom prst="rect">
+            <a:avLst/>
+          </a:prstGeom>
+          <a:solidFill>
+            <a:schemeClr val="bg1">
+              <a:lumMod val="85000"/>
+            </a:schemeClr>
+          </a:solidFill>
+          <a:ln w="28575">
+            <a:solidFill>
+              <a:srgbClr val="FF0000"/>
+            </a:solidFill>
+          </a:ln>
+        </p:spPr>
+        <p:txBody>
+          <a:bodyPr wrap="none" rtlCol="0">
+            <a:spAutoFit/>
+          </a:bodyPr>
+          <a:lstStyle>
+            <a:defPPr>
+              <a:defRPr lang="en-US"/>
+            </a:defPPr>
+          </a:lstStyle>
+          <a:p>
+            <a:r>
+              <a:rPr lang="fr-FR" dirty="0"/>
+              <a:t>https://docs.micropython.org/en/latest/library/espnow.html#module-espnow</a:t>
+            </a:r>
           </a:p>
         </p:txBody>
       </p:sp>
     </p:spTree>
     <p:extLst>
       <p:ext uri="{BB962C8B-B14F-4D97-AF65-F5344CB8AC3E}">
-        <p14:creationId xmlns:p14="http://schemas.microsoft.com/office/powerpoint/2010/main" val="43584320"/>
+        <p14:creationId xmlns:p14="http://schemas.microsoft.com/office/powerpoint/2010/main" val="103624527"/>
       </p:ext>
     </p:extLst>
   </p:cSld>
@@ -13464,6 +13654,199 @@
             <a:r>
               <a:rPr lang="fr-FR" dirty="0" smtClean="0"/>
               <a:t>Pointeurs</a:t>
+            </a:r>
+          </a:p>
+        </p:txBody>
+      </p:sp>
+      <p:sp>
+        <p:nvSpPr>
+          <p:cNvPr id="4" name="ZoneTexte 3"/>
+          <p:cNvSpPr txBox="1"/>
+          <p:nvPr/>
+        </p:nvSpPr>
+        <p:spPr>
+          <a:xfrm>
+            <a:off x="3080951" y="4349578"/>
+            <a:ext cx="7491153" cy="2031325"/>
+          </a:xfrm>
+          <a:prstGeom prst="rect">
+            <a:avLst/>
+          </a:prstGeom>
+          <a:solidFill>
+            <a:schemeClr val="bg1">
+              <a:lumMod val="85000"/>
+            </a:schemeClr>
+          </a:solidFill>
+          <a:ln w="28575">
+            <a:solidFill>
+              <a:srgbClr val="FF0000"/>
+            </a:solidFill>
+          </a:ln>
+        </p:spPr>
+        <p:txBody>
+          <a:bodyPr wrap="none" rtlCol="0">
+            <a:spAutoFit/>
+          </a:bodyPr>
+          <a:lstStyle/>
+          <a:p>
+            <a:r>
+              <a:rPr lang="fr-FR" dirty="0" err="1" smtClean="0">
+                <a:latin typeface="Courier New" panose="02070309020205020404" pitchFamily="49" charset="0"/>
+                <a:cs typeface="Courier New" panose="02070309020205020404" pitchFamily="49" charset="0"/>
+              </a:rPr>
+              <a:t>valeur_i</a:t>
+            </a:r>
+            <a:r>
+              <a:rPr lang="fr-FR" dirty="0" smtClean="0">
+                <a:latin typeface="Courier New" panose="02070309020205020404" pitchFamily="49" charset="0"/>
+                <a:cs typeface="Courier New" panose="02070309020205020404" pitchFamily="49" charset="0"/>
+              </a:rPr>
+              <a:t> = 1244</a:t>
+            </a:r>
+          </a:p>
+          <a:p>
+            <a:r>
+              <a:rPr lang="fr-FR" dirty="0" err="1">
+                <a:latin typeface="Courier New" panose="02070309020205020404" pitchFamily="49" charset="0"/>
+                <a:cs typeface="Courier New" panose="02070309020205020404" pitchFamily="49" charset="0"/>
+              </a:rPr>
+              <a:t>v</a:t>
+            </a:r>
+            <a:r>
+              <a:rPr lang="fr-FR" dirty="0" err="1" smtClean="0">
+                <a:latin typeface="Courier New" panose="02070309020205020404" pitchFamily="49" charset="0"/>
+                <a:cs typeface="Courier New" panose="02070309020205020404" pitchFamily="49" charset="0"/>
+              </a:rPr>
+              <a:t>aleur_f</a:t>
+            </a:r>
+            <a:r>
+              <a:rPr lang="fr-FR" dirty="0" smtClean="0">
+                <a:latin typeface="Courier New" panose="02070309020205020404" pitchFamily="49" charset="0"/>
+                <a:cs typeface="Courier New" panose="02070309020205020404" pitchFamily="49" charset="0"/>
+              </a:rPr>
+              <a:t> = 45.777</a:t>
+            </a:r>
+          </a:p>
+          <a:p>
+            <a:r>
+              <a:rPr lang="fr-FR" dirty="0" err="1">
+                <a:latin typeface="Courier New" panose="02070309020205020404" pitchFamily="49" charset="0"/>
+                <a:cs typeface="Courier New" panose="02070309020205020404" pitchFamily="49" charset="0"/>
+              </a:rPr>
+              <a:t>v</a:t>
+            </a:r>
+            <a:r>
+              <a:rPr lang="fr-FR" dirty="0" err="1" smtClean="0">
+                <a:latin typeface="Courier New" panose="02070309020205020404" pitchFamily="49" charset="0"/>
+                <a:cs typeface="Courier New" panose="02070309020205020404" pitchFamily="49" charset="0"/>
+              </a:rPr>
+              <a:t>aleur_d</a:t>
+            </a:r>
+            <a:r>
+              <a:rPr lang="fr-FR" dirty="0" smtClean="0">
+                <a:latin typeface="Courier New" panose="02070309020205020404" pitchFamily="49" charset="0"/>
+                <a:cs typeface="Courier New" panose="02070309020205020404" pitchFamily="49" charset="0"/>
+              </a:rPr>
+              <a:t> = 23.666 </a:t>
+            </a:r>
+          </a:p>
+          <a:p>
+            <a:r>
+              <a:rPr lang="fr-FR" dirty="0" err="1">
+                <a:latin typeface="Courier New" panose="02070309020205020404" pitchFamily="49" charset="0"/>
+                <a:cs typeface="Courier New" panose="02070309020205020404" pitchFamily="49" charset="0"/>
+              </a:rPr>
+              <a:t>v</a:t>
+            </a:r>
+            <a:r>
+              <a:rPr lang="fr-FR" dirty="0" err="1" smtClean="0">
+                <a:latin typeface="Courier New" panose="02070309020205020404" pitchFamily="49" charset="0"/>
+                <a:cs typeface="Courier New" panose="02070309020205020404" pitchFamily="49" charset="0"/>
+              </a:rPr>
+              <a:t>aleur_b</a:t>
+            </a:r>
+            <a:r>
+              <a:rPr lang="fr-FR" dirty="0" smtClean="0">
+                <a:latin typeface="Courier New" panose="02070309020205020404" pitchFamily="49" charset="0"/>
+                <a:cs typeface="Courier New" panose="02070309020205020404" pitchFamily="49" charset="0"/>
+              </a:rPr>
+              <a:t> = Vrai</a:t>
+            </a:r>
+          </a:p>
+          <a:p>
+            <a:r>
+              <a:rPr lang="fr-FR" dirty="0" err="1" smtClean="0">
+                <a:latin typeface="Courier New" panose="02070309020205020404" pitchFamily="49" charset="0"/>
+                <a:cs typeface="Courier New" panose="02070309020205020404" pitchFamily="49" charset="0"/>
+              </a:rPr>
+              <a:t>valeur_s</a:t>
+            </a:r>
+            <a:r>
+              <a:rPr lang="fr-FR" dirty="0" smtClean="0">
+                <a:latin typeface="Courier New" panose="02070309020205020404" pitchFamily="49" charset="0"/>
+                <a:cs typeface="Courier New" panose="02070309020205020404" pitchFamily="49" charset="0"/>
+              </a:rPr>
+              <a:t> = ‘bonjour tout le monde’</a:t>
+            </a:r>
+          </a:p>
+          <a:p>
+            <a:r>
+              <a:rPr lang="fr-FR" dirty="0" err="1">
+                <a:latin typeface="Courier New" panose="02070309020205020404" pitchFamily="49" charset="0"/>
+                <a:cs typeface="Courier New" panose="02070309020205020404" pitchFamily="49" charset="0"/>
+              </a:rPr>
+              <a:t>v</a:t>
+            </a:r>
+            <a:r>
+              <a:rPr lang="fr-FR" dirty="0" err="1" smtClean="0">
+                <a:latin typeface="Courier New" panose="02070309020205020404" pitchFamily="49" charset="0"/>
+                <a:cs typeface="Courier New" panose="02070309020205020404" pitchFamily="49" charset="0"/>
+              </a:rPr>
+              <a:t>aleur_t</a:t>
+            </a:r>
+            <a:r>
+              <a:rPr lang="fr-FR" dirty="0" smtClean="0">
+                <a:latin typeface="Courier New" panose="02070309020205020404" pitchFamily="49" charset="0"/>
+                <a:cs typeface="Courier New" panose="02070309020205020404" pitchFamily="49" charset="0"/>
+              </a:rPr>
+              <a:t> = [1, 4, 9]</a:t>
+            </a:r>
+          </a:p>
+          <a:p>
+            <a:r>
+              <a:rPr lang="fr-FR" dirty="0" err="1">
+                <a:latin typeface="Courier New" panose="02070309020205020404" pitchFamily="49" charset="0"/>
+                <a:cs typeface="Courier New" panose="02070309020205020404" pitchFamily="49" charset="0"/>
+              </a:rPr>
+              <a:t>v</a:t>
+            </a:r>
+            <a:r>
+              <a:rPr lang="fr-FR" dirty="0" err="1" smtClean="0">
+                <a:latin typeface="Courier New" panose="02070309020205020404" pitchFamily="49" charset="0"/>
+                <a:cs typeface="Courier New" panose="02070309020205020404" pitchFamily="49" charset="0"/>
+              </a:rPr>
+              <a:t>aleur_o</a:t>
+            </a:r>
+            <a:r>
+              <a:rPr lang="fr-FR" dirty="0" smtClean="0">
+                <a:latin typeface="Courier New" panose="02070309020205020404" pitchFamily="49" charset="0"/>
+                <a:cs typeface="Courier New" panose="02070309020205020404" pitchFamily="49" charset="0"/>
+              </a:rPr>
+              <a:t> = {</a:t>
+            </a:r>
+            <a:r>
+              <a:rPr lang="fr-FR" dirty="0">
+                <a:latin typeface="Courier New" panose="02070309020205020404" pitchFamily="49" charset="0"/>
+                <a:cs typeface="Courier New" panose="02070309020205020404" pitchFamily="49" charset="0"/>
+              </a:rPr>
+              <a:t>1244, 45.777, Vrai, ‘bonjour’, [1, 4, 9</a:t>
+            </a:r>
+            <a:r>
+              <a:rPr lang="fr-FR" dirty="0" smtClean="0">
+                <a:latin typeface="Courier New" panose="02070309020205020404" pitchFamily="49" charset="0"/>
+                <a:cs typeface="Courier New" panose="02070309020205020404" pitchFamily="49" charset="0"/>
+              </a:rPr>
+              <a:t>]}</a:t>
             </a:r>
           </a:p>
         </p:txBody>
@@ -13514,8 +13897,8 @@
           <a:lstStyle/>
           <a:p>
             <a:r>
-              <a:rPr lang="fr-FR" dirty="0" smtClean="0"/>
-              <a:t>Valeurs	</a:t>
+              <a:rPr lang="fr-FR" dirty="0" err="1" smtClean="0"/>
+              <a:t>Print</a:t>
             </a:r>
             <a:endParaRPr lang="fr-FR" dirty="0"/>
           </a:p>
@@ -13523,39 +13906,431 @@
       </p:sp>
       <p:sp>
         <p:nvSpPr>
-          <p:cNvPr id="3" name="Espace réservé du contenu 2"/>
-          <p:cNvSpPr>
-            <a:spLocks noGrp="1"/>
-          </p:cNvSpPr>
-          <p:nvPr>
-            <p:ph idx="1"/>
-          </p:nvPr>
+          <p:cNvPr id="4" name="ZoneTexte 3"/>
+          <p:cNvSpPr txBox="1"/>
+          <p:nvPr/>
         </p:nvSpPr>
-        <p:spPr/>
+        <p:spPr>
+          <a:xfrm>
+            <a:off x="1178011" y="2660821"/>
+            <a:ext cx="4458272" cy="3139321"/>
+          </a:xfrm>
+          <a:prstGeom prst="rect">
+            <a:avLst/>
+          </a:prstGeom>
+          <a:solidFill>
+            <a:schemeClr val="bg1">
+              <a:lumMod val="85000"/>
+            </a:schemeClr>
+          </a:solidFill>
+          <a:ln w="28575">
+            <a:solidFill>
+              <a:srgbClr val="FF0000"/>
+            </a:solidFill>
+          </a:ln>
+        </p:spPr>
         <p:txBody>
-          <a:bodyPr/>
+          <a:bodyPr wrap="none" rtlCol="0">
+            <a:spAutoFit/>
+          </a:bodyPr>
           <a:lstStyle/>
           <a:p>
             <a:r>
-              <a:rPr lang="fr-FR" dirty="0" smtClean="0"/>
-              <a:t>Constantes</a:t>
-            </a:r>
-          </a:p>
-          <a:p>
-            <a:r>
-              <a:rPr lang="fr-FR" dirty="0" smtClean="0"/>
-              <a:t>Variables</a:t>
-            </a:r>
-          </a:p>
-          <a:p>
-            <a:endParaRPr lang="fr-FR" dirty="0"/>
+              <a:rPr lang="fr-FR" dirty="0" err="1" smtClean="0">
+                <a:latin typeface="Courier New" panose="02070309020205020404" pitchFamily="49" charset="0"/>
+                <a:cs typeface="Courier New" panose="02070309020205020404" pitchFamily="49" charset="0"/>
+              </a:rPr>
+              <a:t>print</a:t>
+            </a:r>
+            <a:r>
+              <a:rPr lang="fr-FR" dirty="0">
+                <a:latin typeface="Courier New" panose="02070309020205020404" pitchFamily="49" charset="0"/>
+                <a:cs typeface="Courier New" panose="02070309020205020404" pitchFamily="49" charset="0"/>
+              </a:rPr>
+              <a:t>(</a:t>
+            </a:r>
+            <a:r>
+              <a:rPr lang="fr-FR" dirty="0" smtClean="0">
+                <a:latin typeface="Courier New" panose="02070309020205020404" pitchFamily="49" charset="0"/>
+                <a:cs typeface="Courier New" panose="02070309020205020404" pitchFamily="49" charset="0"/>
+              </a:rPr>
+              <a:t>'bonjour tout le monde')</a:t>
+            </a:r>
+          </a:p>
+          <a:p>
+            <a:endParaRPr lang="fr-FR" dirty="0" smtClean="0">
+              <a:latin typeface="Courier New" panose="02070309020205020404" pitchFamily="49" charset="0"/>
+              <a:cs typeface="Courier New" panose="02070309020205020404" pitchFamily="49" charset="0"/>
+            </a:endParaRPr>
+          </a:p>
+          <a:p>
+            <a:r>
+              <a:rPr lang="fr-FR" dirty="0" smtClean="0">
+                <a:latin typeface="Courier New" panose="02070309020205020404" pitchFamily="49" charset="0"/>
+                <a:cs typeface="Courier New" panose="02070309020205020404" pitchFamily="49" charset="0"/>
+              </a:rPr>
+              <a:t>x = 12.33</a:t>
+            </a:r>
+          </a:p>
+          <a:p>
+            <a:r>
+              <a:rPr lang="fr-FR" dirty="0" smtClean="0">
+                <a:latin typeface="Courier New" panose="02070309020205020404" pitchFamily="49" charset="0"/>
+                <a:cs typeface="Courier New" panose="02070309020205020404" pitchFamily="49" charset="0"/>
+              </a:rPr>
+              <a:t>y = 44</a:t>
+            </a:r>
+          </a:p>
+          <a:p>
+            <a:r>
+              <a:rPr lang="fr-FR" dirty="0" smtClean="0">
+                <a:latin typeface="Courier New" panose="02070309020205020404" pitchFamily="49" charset="0"/>
+                <a:cs typeface="Courier New" panose="02070309020205020404" pitchFamily="49" charset="0"/>
+              </a:rPr>
+              <a:t>t = [1, 2, 3]</a:t>
+            </a:r>
+          </a:p>
+          <a:p>
+            <a:endParaRPr lang="fr-FR" dirty="0" smtClean="0">
+              <a:latin typeface="Courier New" panose="02070309020205020404" pitchFamily="49" charset="0"/>
+              <a:cs typeface="Courier New" panose="02070309020205020404" pitchFamily="49" charset="0"/>
+            </a:endParaRPr>
+          </a:p>
+          <a:p>
+            <a:r>
+              <a:rPr lang="fr-FR" dirty="0" err="1" smtClean="0">
+                <a:latin typeface="Courier New" panose="02070309020205020404" pitchFamily="49" charset="0"/>
+                <a:cs typeface="Courier New" panose="02070309020205020404" pitchFamily="49" charset="0"/>
+              </a:rPr>
+              <a:t>print</a:t>
+            </a:r>
+            <a:r>
+              <a:rPr lang="fr-FR" dirty="0" smtClean="0">
+                <a:latin typeface="Courier New" panose="02070309020205020404" pitchFamily="49" charset="0"/>
+                <a:cs typeface="Courier New" panose="02070309020205020404" pitchFamily="49" charset="0"/>
+              </a:rPr>
+              <a:t>(</a:t>
+            </a:r>
+            <a:r>
+              <a:rPr lang="fr-FR" dirty="0">
+                <a:latin typeface="Courier New" panose="02070309020205020404" pitchFamily="49" charset="0"/>
+                <a:cs typeface="Courier New" panose="02070309020205020404" pitchFamily="49" charset="0"/>
+              </a:rPr>
+              <a:t>'</a:t>
+            </a:r>
+            <a:r>
+              <a:rPr lang="fr-FR" dirty="0" smtClean="0">
+                <a:latin typeface="Courier New" panose="02070309020205020404" pitchFamily="49" charset="0"/>
+                <a:cs typeface="Courier New" panose="02070309020205020404" pitchFamily="49" charset="0"/>
+              </a:rPr>
+              <a:t>x=</a:t>
+            </a:r>
+            <a:r>
+              <a:rPr lang="fr-FR" dirty="0">
+                <a:latin typeface="Courier New" panose="02070309020205020404" pitchFamily="49" charset="0"/>
+                <a:cs typeface="Courier New" panose="02070309020205020404" pitchFamily="49" charset="0"/>
+              </a:rPr>
+              <a:t>'</a:t>
+            </a:r>
+            <a:r>
+              <a:rPr lang="fr-FR" dirty="0" smtClean="0">
+                <a:latin typeface="Courier New" panose="02070309020205020404" pitchFamily="49" charset="0"/>
+                <a:cs typeface="Courier New" panose="02070309020205020404" pitchFamily="49" charset="0"/>
+              </a:rPr>
+              <a:t>, x, </a:t>
+            </a:r>
+            <a:r>
+              <a:rPr lang="fr-FR" dirty="0">
+                <a:latin typeface="Courier New" panose="02070309020205020404" pitchFamily="49" charset="0"/>
+                <a:cs typeface="Courier New" panose="02070309020205020404" pitchFamily="49" charset="0"/>
+              </a:rPr>
+              <a:t>'</a:t>
+            </a:r>
+            <a:r>
+              <a:rPr lang="fr-FR" dirty="0" smtClean="0">
+                <a:latin typeface="Courier New" panose="02070309020205020404" pitchFamily="49" charset="0"/>
+                <a:cs typeface="Courier New" panose="02070309020205020404" pitchFamily="49" charset="0"/>
+              </a:rPr>
+              <a:t>y=</a:t>
+            </a:r>
+            <a:r>
+              <a:rPr lang="fr-FR" dirty="0">
+                <a:latin typeface="Courier New" panose="02070309020205020404" pitchFamily="49" charset="0"/>
+                <a:cs typeface="Courier New" panose="02070309020205020404" pitchFamily="49" charset="0"/>
+              </a:rPr>
+              <a:t>'</a:t>
+            </a:r>
+            <a:r>
+              <a:rPr lang="fr-FR" dirty="0" smtClean="0">
+                <a:latin typeface="Courier New" panose="02070309020205020404" pitchFamily="49" charset="0"/>
+                <a:cs typeface="Courier New" panose="02070309020205020404" pitchFamily="49" charset="0"/>
+              </a:rPr>
+              <a:t>, y)</a:t>
+            </a:r>
+          </a:p>
+          <a:p>
+            <a:endParaRPr lang="fr-FR" dirty="0" smtClean="0">
+              <a:latin typeface="Courier New" panose="02070309020205020404" pitchFamily="49" charset="0"/>
+              <a:cs typeface="Courier New" panose="02070309020205020404" pitchFamily="49" charset="0"/>
+            </a:endParaRPr>
+          </a:p>
+          <a:p>
+            <a:r>
+              <a:rPr lang="fr-FR" dirty="0" err="1" smtClean="0">
+                <a:latin typeface="Courier New" panose="02070309020205020404" pitchFamily="49" charset="0"/>
+                <a:cs typeface="Courier New" panose="02070309020205020404" pitchFamily="49" charset="0"/>
+              </a:rPr>
+              <a:t>print</a:t>
+            </a:r>
+            <a:r>
+              <a:rPr lang="fr-FR" dirty="0" smtClean="0">
+                <a:latin typeface="Courier New" panose="02070309020205020404" pitchFamily="49" charset="0"/>
+                <a:cs typeface="Courier New" panose="02070309020205020404" pitchFamily="49" charset="0"/>
+              </a:rPr>
+              <a:t>(</a:t>
+            </a:r>
+            <a:r>
+              <a:rPr lang="fr-FR" dirty="0" err="1" smtClean="0">
+                <a:latin typeface="Courier New" panose="02070309020205020404" pitchFamily="49" charset="0"/>
+                <a:cs typeface="Courier New" panose="02070309020205020404" pitchFamily="49" charset="0"/>
+              </a:rPr>
+              <a:t>f'x</a:t>
+            </a:r>
+            <a:r>
+              <a:rPr lang="fr-FR" dirty="0" smtClean="0">
+                <a:latin typeface="Courier New" panose="02070309020205020404" pitchFamily="49" charset="0"/>
+                <a:cs typeface="Courier New" panose="02070309020205020404" pitchFamily="49" charset="0"/>
+              </a:rPr>
+              <a:t>={x} y={y}')</a:t>
+            </a:r>
+          </a:p>
+          <a:p>
+            <a:endParaRPr lang="fr-FR" dirty="0" smtClean="0">
+              <a:latin typeface="Courier New" panose="02070309020205020404" pitchFamily="49" charset="0"/>
+              <a:cs typeface="Courier New" panose="02070309020205020404" pitchFamily="49" charset="0"/>
+            </a:endParaRPr>
+          </a:p>
+          <a:p>
+            <a:r>
+              <a:rPr lang="fr-FR" dirty="0" err="1" smtClean="0">
+                <a:latin typeface="Courier New" panose="02070309020205020404" pitchFamily="49" charset="0"/>
+                <a:cs typeface="Courier New" panose="02070309020205020404" pitchFamily="49" charset="0"/>
+              </a:rPr>
+              <a:t>print</a:t>
+            </a:r>
+            <a:r>
+              <a:rPr lang="fr-FR" dirty="0" smtClean="0">
+                <a:latin typeface="Courier New" panose="02070309020205020404" pitchFamily="49" charset="0"/>
+                <a:cs typeface="Courier New" panose="02070309020205020404" pitchFamily="49" charset="0"/>
+              </a:rPr>
+              <a:t>(</a:t>
+            </a:r>
+            <a:r>
+              <a:rPr lang="fr-FR" dirty="0" err="1" smtClean="0">
+                <a:latin typeface="Courier New" panose="02070309020205020404" pitchFamily="49" charset="0"/>
+                <a:cs typeface="Courier New" panose="02070309020205020404" pitchFamily="49" charset="0"/>
+              </a:rPr>
+              <a:t>f'le</a:t>
+            </a:r>
+            <a:r>
+              <a:rPr lang="fr-FR" dirty="0" smtClean="0">
+                <a:latin typeface="Courier New" panose="02070309020205020404" pitchFamily="49" charset="0"/>
+                <a:cs typeface="Courier New" panose="02070309020205020404" pitchFamily="49" charset="0"/>
+              </a:rPr>
+              <a:t> tableau t vaut {t}')</a:t>
+            </a:r>
+          </a:p>
+        </p:txBody>
+      </p:sp>
+      <p:sp>
+        <p:nvSpPr>
+          <p:cNvPr id="6" name="Rectangle à coins arrondis 5"/>
+          <p:cNvSpPr/>
+          <p:nvPr/>
+        </p:nvSpPr>
+        <p:spPr>
+          <a:xfrm>
+            <a:off x="6697361" y="2570206"/>
+            <a:ext cx="2100649" cy="551935"/>
+          </a:xfrm>
+          <a:prstGeom prst="wedgeRoundRectCallout">
+            <a:avLst>
+              <a:gd name="adj1" fmla="val -94601"/>
+              <a:gd name="adj2" fmla="val -6157"/>
+              <a:gd name="adj3" fmla="val 16667"/>
+            </a:avLst>
+          </a:prstGeom>
+          <a:solidFill>
+            <a:srgbClr val="FFFF00"/>
+          </a:solidFill>
+        </p:spPr>
+        <p:style>
+          <a:lnRef idx="2">
+            <a:schemeClr val="accent1">
+              <a:shade val="50000"/>
+            </a:schemeClr>
+          </a:lnRef>
+          <a:fillRef idx="1">
+            <a:schemeClr val="accent1"/>
+          </a:fillRef>
+          <a:effectRef idx="0">
+            <a:schemeClr val="accent1"/>
+          </a:effectRef>
+          <a:fontRef idx="minor">
+            <a:schemeClr val="lt1"/>
+          </a:fontRef>
+        </p:style>
+        <p:txBody>
+          <a:bodyPr rtlCol="0" anchor="ctr"/>
+          <a:lstStyle/>
+          <a:p>
+            <a:pPr algn="ctr"/>
+            <a:r>
+              <a:rPr lang="fr-FR" dirty="0" smtClean="0">
+                <a:solidFill>
+                  <a:schemeClr val="tx1"/>
+                </a:solidFill>
+              </a:rPr>
+              <a:t>Sortie minimale à l’écran</a:t>
+            </a:r>
+            <a:endParaRPr lang="fr-FR" dirty="0">
+              <a:solidFill>
+                <a:schemeClr val="tx1"/>
+              </a:solidFill>
+            </a:endParaRPr>
+          </a:p>
+        </p:txBody>
+      </p:sp>
+      <p:sp>
+        <p:nvSpPr>
+          <p:cNvPr id="7" name="Rectangle à coins arrondis 6"/>
+          <p:cNvSpPr/>
+          <p:nvPr/>
+        </p:nvSpPr>
+        <p:spPr>
+          <a:xfrm>
+            <a:off x="5820032" y="3752336"/>
+            <a:ext cx="2903838" cy="551935"/>
+          </a:xfrm>
+          <a:prstGeom prst="wedgeRoundRectCallout">
+            <a:avLst>
+              <a:gd name="adj1" fmla="val -95501"/>
+              <a:gd name="adj2" fmla="val 77426"/>
+              <a:gd name="adj3" fmla="val 16667"/>
+            </a:avLst>
+          </a:prstGeom>
+          <a:solidFill>
+            <a:srgbClr val="FFFF00"/>
+          </a:solidFill>
+        </p:spPr>
+        <p:style>
+          <a:lnRef idx="2">
+            <a:schemeClr val="accent1">
+              <a:shade val="50000"/>
+            </a:schemeClr>
+          </a:lnRef>
+          <a:fillRef idx="1">
+            <a:schemeClr val="accent1"/>
+          </a:fillRef>
+          <a:effectRef idx="0">
+            <a:schemeClr val="accent1"/>
+          </a:effectRef>
+          <a:fontRef idx="minor">
+            <a:schemeClr val="lt1"/>
+          </a:fontRef>
+        </p:style>
+        <p:txBody>
+          <a:bodyPr rtlCol="0" anchor="ctr"/>
+          <a:lstStyle/>
+          <a:p>
+            <a:pPr algn="ctr"/>
+            <a:r>
+              <a:rPr lang="fr-FR" dirty="0" smtClean="0">
+                <a:solidFill>
+                  <a:schemeClr val="tx1"/>
+                </a:solidFill>
+              </a:rPr>
+              <a:t>Enchaîner des sorties individuelles</a:t>
+            </a:r>
+            <a:endParaRPr lang="fr-FR" dirty="0">
+              <a:solidFill>
+                <a:schemeClr val="tx1"/>
+              </a:solidFill>
+            </a:endParaRPr>
+          </a:p>
+        </p:txBody>
+      </p:sp>
+      <p:sp>
+        <p:nvSpPr>
+          <p:cNvPr id="8" name="Rectangle à coins arrondis 7"/>
+          <p:cNvSpPr/>
+          <p:nvPr/>
+        </p:nvSpPr>
+        <p:spPr>
+          <a:xfrm>
+            <a:off x="5700583" y="4777946"/>
+            <a:ext cx="2809103" cy="551935"/>
+          </a:xfrm>
+          <a:prstGeom prst="wedgeRoundRectCallout">
+            <a:avLst>
+              <a:gd name="adj1" fmla="val -102270"/>
+              <a:gd name="adj2" fmla="val 5784"/>
+              <a:gd name="adj3" fmla="val 16667"/>
+            </a:avLst>
+          </a:prstGeom>
+          <a:solidFill>
+            <a:srgbClr val="FFFF00"/>
+          </a:solidFill>
+        </p:spPr>
+        <p:style>
+          <a:lnRef idx="2">
+            <a:schemeClr val="accent1">
+              <a:shade val="50000"/>
+            </a:schemeClr>
+          </a:lnRef>
+          <a:fillRef idx="1">
+            <a:schemeClr val="accent1"/>
+          </a:fillRef>
+          <a:effectRef idx="0">
+            <a:schemeClr val="accent1"/>
+          </a:effectRef>
+          <a:fontRef idx="minor">
+            <a:schemeClr val="lt1"/>
+          </a:fontRef>
+        </p:style>
+        <p:txBody>
+          <a:bodyPr rtlCol="0" anchor="ctr"/>
+          <a:lstStyle/>
+          <a:p>
+            <a:pPr algn="ctr"/>
+            <a:r>
+              <a:rPr lang="fr-FR" dirty="0" err="1" smtClean="0">
+                <a:solidFill>
+                  <a:schemeClr val="tx1"/>
+                </a:solidFill>
+              </a:rPr>
+              <a:t>Formatter</a:t>
+            </a:r>
+            <a:r>
+              <a:rPr lang="fr-FR" dirty="0" smtClean="0">
+                <a:solidFill>
+                  <a:schemeClr val="tx1"/>
+                </a:solidFill>
+              </a:rPr>
+              <a:t> l’impression </a:t>
+            </a:r>
+            <a:endParaRPr lang="fr-FR" dirty="0">
+              <a:solidFill>
+                <a:schemeClr val="tx1"/>
+              </a:solidFill>
+            </a:endParaRPr>
           </a:p>
         </p:txBody>
       </p:sp>
     </p:spTree>
     <p:extLst>
       <p:ext uri="{BB962C8B-B14F-4D97-AF65-F5344CB8AC3E}">
-        <p14:creationId xmlns:p14="http://schemas.microsoft.com/office/powerpoint/2010/main" val="1885535489"/>
+        <p14:creationId xmlns:p14="http://schemas.microsoft.com/office/powerpoint/2010/main" val="917487835"/>
       </p:ext>
     </p:extLst>
   </p:cSld>
@@ -13598,36 +14373,387 @@
           <a:lstStyle/>
           <a:p>
             <a:r>
-              <a:rPr lang="fr-FR" dirty="0" smtClean="0"/>
-              <a:t>Opérateurs</a:t>
-            </a:r>
-            <a:endParaRPr lang="fr-FR" dirty="0"/>
+              <a:rPr lang="fr-FR" smtClean="0"/>
+              <a:t>Les fonctions</a:t>
+            </a:r>
+            <a:endParaRPr lang="fr-FR"/>
           </a:p>
         </p:txBody>
       </p:sp>
       <p:sp>
         <p:nvSpPr>
-          <p:cNvPr id="3" name="Espace réservé du contenu 2"/>
-          <p:cNvSpPr>
-            <a:spLocks noGrp="1"/>
-          </p:cNvSpPr>
-          <p:nvPr>
-            <p:ph idx="1"/>
-          </p:nvPr>
+          <p:cNvPr id="4" name="ZoneTexte 3"/>
+          <p:cNvSpPr txBox="1"/>
+          <p:nvPr/>
         </p:nvSpPr>
-        <p:spPr/>
+        <p:spPr>
+          <a:xfrm>
+            <a:off x="1178011" y="2660821"/>
+            <a:ext cx="3906839" cy="923330"/>
+          </a:xfrm>
+          <a:prstGeom prst="rect">
+            <a:avLst/>
+          </a:prstGeom>
+          <a:solidFill>
+            <a:schemeClr val="bg1">
+              <a:lumMod val="85000"/>
+            </a:schemeClr>
+          </a:solidFill>
+          <a:ln w="28575">
+            <a:solidFill>
+              <a:srgbClr val="FF0000"/>
+            </a:solidFill>
+          </a:ln>
+        </p:spPr>
         <p:txBody>
-          <a:bodyPr/>
+          <a:bodyPr wrap="none" rtlCol="0">
+            <a:spAutoFit/>
+          </a:bodyPr>
           <a:lstStyle/>
           <a:p>
-            <a:endParaRPr lang="fr-FR" dirty="0"/>
+            <a:r>
+              <a:rPr lang="fr-FR" b="1" dirty="0" err="1" smtClean="0">
+                <a:latin typeface="Courier New" panose="02070309020205020404" pitchFamily="49" charset="0"/>
+                <a:cs typeface="Courier New" panose="02070309020205020404" pitchFamily="49" charset="0"/>
+              </a:rPr>
+              <a:t>def</a:t>
+            </a:r>
+            <a:r>
+              <a:rPr lang="fr-FR" dirty="0" smtClean="0">
+                <a:latin typeface="Courier New" panose="02070309020205020404" pitchFamily="49" charset="0"/>
+                <a:cs typeface="Courier New" panose="02070309020205020404" pitchFamily="49" charset="0"/>
+              </a:rPr>
+              <a:t> piloter</a:t>
+            </a:r>
+            <a:r>
+              <a:rPr lang="fr-FR" b="1" dirty="0" smtClean="0">
+                <a:latin typeface="Courier New" panose="02070309020205020404" pitchFamily="49" charset="0"/>
+                <a:cs typeface="Courier New" panose="02070309020205020404" pitchFamily="49" charset="0"/>
+              </a:rPr>
+              <a:t>(</a:t>
+            </a:r>
+            <a:r>
+              <a:rPr lang="fr-FR" dirty="0" smtClean="0">
+                <a:latin typeface="Courier New" panose="02070309020205020404" pitchFamily="49" charset="0"/>
+                <a:cs typeface="Courier New" panose="02070309020205020404" pitchFamily="49" charset="0"/>
+              </a:rPr>
+              <a:t>arg1, arg2, …</a:t>
+            </a:r>
+            <a:r>
+              <a:rPr lang="fr-FR" b="1" dirty="0" smtClean="0">
+                <a:latin typeface="Courier New" panose="02070309020205020404" pitchFamily="49" charset="0"/>
+                <a:cs typeface="Courier New" panose="02070309020205020404" pitchFamily="49" charset="0"/>
+              </a:rPr>
+              <a:t>):</a:t>
+            </a:r>
+          </a:p>
+          <a:p>
+            <a:r>
+              <a:rPr lang="fr-FR" dirty="0">
+                <a:latin typeface="Courier New" panose="02070309020205020404" pitchFamily="49" charset="0"/>
+                <a:cs typeface="Courier New" panose="02070309020205020404" pitchFamily="49" charset="0"/>
+              </a:rPr>
+              <a:t>	</a:t>
+            </a:r>
+            <a:r>
+              <a:rPr lang="fr-FR" dirty="0" smtClean="0">
+                <a:latin typeface="Courier New" panose="02070309020205020404" pitchFamily="49" charset="0"/>
+                <a:cs typeface="Courier New" panose="02070309020205020404" pitchFamily="49" charset="0"/>
+              </a:rPr>
+              <a:t>code</a:t>
+            </a:r>
+          </a:p>
+          <a:p>
+            <a:r>
+              <a:rPr lang="fr-FR" dirty="0">
+                <a:latin typeface="Courier New" panose="02070309020205020404" pitchFamily="49" charset="0"/>
+                <a:cs typeface="Courier New" panose="02070309020205020404" pitchFamily="49" charset="0"/>
+              </a:rPr>
+              <a:t>	</a:t>
+            </a:r>
+            <a:r>
+              <a:rPr lang="fr-FR" dirty="0" smtClean="0">
+                <a:latin typeface="Courier New" panose="02070309020205020404" pitchFamily="49" charset="0"/>
+                <a:cs typeface="Courier New" panose="02070309020205020404" pitchFamily="49" charset="0"/>
+              </a:rPr>
+              <a:t>code</a:t>
+            </a:r>
+          </a:p>
+        </p:txBody>
+      </p:sp>
+      <p:sp>
+        <p:nvSpPr>
+          <p:cNvPr id="5" name="ZoneTexte 4"/>
+          <p:cNvSpPr txBox="1"/>
+          <p:nvPr/>
+        </p:nvSpPr>
+        <p:spPr>
+          <a:xfrm>
+            <a:off x="1256271" y="4040659"/>
+            <a:ext cx="4044697" cy="1200329"/>
+          </a:xfrm>
+          <a:prstGeom prst="rect">
+            <a:avLst/>
+          </a:prstGeom>
+          <a:solidFill>
+            <a:schemeClr val="bg1">
+              <a:lumMod val="85000"/>
+            </a:schemeClr>
+          </a:solidFill>
+          <a:ln w="28575">
+            <a:solidFill>
+              <a:srgbClr val="FF0000"/>
+            </a:solidFill>
+          </a:ln>
+        </p:spPr>
+        <p:txBody>
+          <a:bodyPr wrap="none" rtlCol="0">
+            <a:spAutoFit/>
+          </a:bodyPr>
+          <a:lstStyle/>
+          <a:p>
+            <a:r>
+              <a:rPr lang="fr-FR" b="1" dirty="0" err="1" smtClean="0">
+                <a:latin typeface="Courier New" panose="02070309020205020404" pitchFamily="49" charset="0"/>
+                <a:cs typeface="Courier New" panose="02070309020205020404" pitchFamily="49" charset="0"/>
+              </a:rPr>
+              <a:t>def</a:t>
+            </a:r>
+            <a:r>
+              <a:rPr lang="fr-FR" dirty="0" smtClean="0">
+                <a:latin typeface="Courier New" panose="02070309020205020404" pitchFamily="49" charset="0"/>
+                <a:cs typeface="Courier New" panose="02070309020205020404" pitchFamily="49" charset="0"/>
+              </a:rPr>
+              <a:t> calculer</a:t>
+            </a:r>
+            <a:r>
+              <a:rPr lang="fr-FR" b="1" dirty="0" smtClean="0">
+                <a:latin typeface="Courier New" panose="02070309020205020404" pitchFamily="49" charset="0"/>
+                <a:cs typeface="Courier New" panose="02070309020205020404" pitchFamily="49" charset="0"/>
+              </a:rPr>
+              <a:t>(</a:t>
+            </a:r>
+            <a:r>
+              <a:rPr lang="fr-FR" dirty="0">
+                <a:latin typeface="Courier New" panose="02070309020205020404" pitchFamily="49" charset="0"/>
+                <a:cs typeface="Courier New" panose="02070309020205020404" pitchFamily="49" charset="0"/>
+              </a:rPr>
+              <a:t>arg1, arg2, …</a:t>
+            </a:r>
+            <a:r>
+              <a:rPr lang="fr-FR" b="1" dirty="0" smtClean="0">
+                <a:latin typeface="Courier New" panose="02070309020205020404" pitchFamily="49" charset="0"/>
+                <a:cs typeface="Courier New" panose="02070309020205020404" pitchFamily="49" charset="0"/>
+              </a:rPr>
+              <a:t>):</a:t>
+            </a:r>
+          </a:p>
+          <a:p>
+            <a:r>
+              <a:rPr lang="fr-FR" dirty="0">
+                <a:latin typeface="Courier New" panose="02070309020205020404" pitchFamily="49" charset="0"/>
+                <a:cs typeface="Courier New" panose="02070309020205020404" pitchFamily="49" charset="0"/>
+              </a:rPr>
+              <a:t>	</a:t>
+            </a:r>
+            <a:r>
+              <a:rPr lang="fr-FR" dirty="0" smtClean="0">
+                <a:latin typeface="Courier New" panose="02070309020205020404" pitchFamily="49" charset="0"/>
+                <a:cs typeface="Courier New" panose="02070309020205020404" pitchFamily="49" charset="0"/>
+              </a:rPr>
+              <a:t>code</a:t>
+            </a:r>
+          </a:p>
+          <a:p>
+            <a:r>
+              <a:rPr lang="fr-FR" dirty="0">
+                <a:latin typeface="Courier New" panose="02070309020205020404" pitchFamily="49" charset="0"/>
+                <a:cs typeface="Courier New" panose="02070309020205020404" pitchFamily="49" charset="0"/>
+              </a:rPr>
+              <a:t>	</a:t>
+            </a:r>
+            <a:r>
+              <a:rPr lang="fr-FR" dirty="0" smtClean="0">
+                <a:latin typeface="Courier New" panose="02070309020205020404" pitchFamily="49" charset="0"/>
+                <a:cs typeface="Courier New" panose="02070309020205020404" pitchFamily="49" charset="0"/>
+              </a:rPr>
+              <a:t>code</a:t>
+            </a:r>
+          </a:p>
+          <a:p>
+            <a:r>
+              <a:rPr lang="fr-FR" dirty="0">
+                <a:latin typeface="Courier New" panose="02070309020205020404" pitchFamily="49" charset="0"/>
+                <a:cs typeface="Courier New" panose="02070309020205020404" pitchFamily="49" charset="0"/>
+              </a:rPr>
+              <a:t>	</a:t>
+            </a:r>
+            <a:r>
+              <a:rPr lang="fr-FR" dirty="0" smtClean="0">
+                <a:latin typeface="Courier New" panose="02070309020205020404" pitchFamily="49" charset="0"/>
+                <a:cs typeface="Courier New" panose="02070309020205020404" pitchFamily="49" charset="0"/>
+              </a:rPr>
+              <a:t>return </a:t>
+            </a:r>
+            <a:r>
+              <a:rPr lang="fr-FR" dirty="0" err="1" smtClean="0">
+                <a:latin typeface="Courier New" panose="02070309020205020404" pitchFamily="49" charset="0"/>
+                <a:cs typeface="Courier New" panose="02070309020205020404" pitchFamily="49" charset="0"/>
+              </a:rPr>
+              <a:t>resultat</a:t>
+            </a:r>
+            <a:endParaRPr lang="fr-FR" dirty="0" smtClean="0">
+              <a:latin typeface="Courier New" panose="02070309020205020404" pitchFamily="49" charset="0"/>
+              <a:cs typeface="Courier New" panose="02070309020205020404" pitchFamily="49" charset="0"/>
+            </a:endParaRPr>
+          </a:p>
+        </p:txBody>
+      </p:sp>
+      <p:sp>
+        <p:nvSpPr>
+          <p:cNvPr id="6" name="Rectangle à coins arrondis 5"/>
+          <p:cNvSpPr/>
+          <p:nvPr/>
+        </p:nvSpPr>
+        <p:spPr>
+          <a:xfrm>
+            <a:off x="6697361" y="2578444"/>
+            <a:ext cx="4308390" cy="1178010"/>
+          </a:xfrm>
+          <a:prstGeom prst="wedgeRoundRectCallout">
+            <a:avLst>
+              <a:gd name="adj1" fmla="val -81408"/>
+              <a:gd name="adj2" fmla="val -22241"/>
+              <a:gd name="adj3" fmla="val 16667"/>
+            </a:avLst>
+          </a:prstGeom>
+          <a:solidFill>
+            <a:srgbClr val="FFFF00"/>
+          </a:solidFill>
+        </p:spPr>
+        <p:style>
+          <a:lnRef idx="2">
+            <a:schemeClr val="accent1">
+              <a:shade val="50000"/>
+            </a:schemeClr>
+          </a:lnRef>
+          <a:fillRef idx="1">
+            <a:schemeClr val="accent1"/>
+          </a:fillRef>
+          <a:effectRef idx="0">
+            <a:schemeClr val="accent1"/>
+          </a:effectRef>
+          <a:fontRef idx="minor">
+            <a:schemeClr val="lt1"/>
+          </a:fontRef>
+        </p:style>
+        <p:txBody>
+          <a:bodyPr rtlCol="0" anchor="ctr"/>
+          <a:lstStyle/>
+          <a:p>
+            <a:r>
+              <a:rPr lang="fr-FR" dirty="0" smtClean="0">
+                <a:solidFill>
+                  <a:schemeClr val="tx1"/>
+                </a:solidFill>
+              </a:rPr>
+              <a:t>Structure générale:</a:t>
+            </a:r>
+          </a:p>
+          <a:p>
+            <a:endParaRPr lang="fr-FR" dirty="0" smtClean="0">
+              <a:solidFill>
+                <a:schemeClr val="tx1"/>
+              </a:solidFill>
+            </a:endParaRPr>
+          </a:p>
+          <a:p>
+            <a:r>
+              <a:rPr lang="fr-FR" b="1" dirty="0" err="1" smtClean="0">
+                <a:solidFill>
+                  <a:schemeClr val="tx1"/>
+                </a:solidFill>
+              </a:rPr>
+              <a:t>def</a:t>
+            </a:r>
+            <a:r>
+              <a:rPr lang="fr-FR" dirty="0" smtClean="0">
+                <a:solidFill>
+                  <a:schemeClr val="tx1"/>
+                </a:solidFill>
+              </a:rPr>
+              <a:t> nom </a:t>
+            </a:r>
+            <a:r>
+              <a:rPr lang="fr-FR" b="1" dirty="0" smtClean="0">
+                <a:solidFill>
+                  <a:schemeClr val="tx1"/>
+                </a:solidFill>
+              </a:rPr>
+              <a:t>(</a:t>
+            </a:r>
+            <a:r>
+              <a:rPr lang="fr-FR" dirty="0" smtClean="0">
+                <a:solidFill>
+                  <a:schemeClr val="tx1"/>
+                </a:solidFill>
+              </a:rPr>
+              <a:t>arguments</a:t>
+            </a:r>
+            <a:r>
+              <a:rPr lang="fr-FR" b="1" dirty="0" smtClean="0">
+                <a:solidFill>
+                  <a:schemeClr val="tx1"/>
+                </a:solidFill>
+              </a:rPr>
+              <a:t>) :</a:t>
+            </a:r>
+          </a:p>
+          <a:p>
+            <a:r>
+              <a:rPr lang="fr-FR" b="1" dirty="0" smtClean="0">
+                <a:solidFill>
+                  <a:schemeClr val="tx1"/>
+                </a:solidFill>
+              </a:rPr>
+              <a:t>&lt;</a:t>
+            </a:r>
+            <a:r>
+              <a:rPr lang="fr-FR" b="1" dirty="0" err="1" smtClean="0">
+                <a:solidFill>
+                  <a:schemeClr val="tx1"/>
+                </a:solidFill>
+              </a:rPr>
+              <a:t>indent</a:t>
+            </a:r>
+            <a:r>
+              <a:rPr lang="fr-FR" b="1" dirty="0" smtClean="0">
+                <a:solidFill>
+                  <a:schemeClr val="tx1"/>
+                </a:solidFill>
+              </a:rPr>
+              <a:t>&gt;</a:t>
+            </a:r>
+            <a:r>
+              <a:rPr lang="fr-FR" dirty="0" smtClean="0">
+                <a:solidFill>
+                  <a:schemeClr val="tx1"/>
+                </a:solidFill>
+              </a:rPr>
+              <a:t>Bloc de code</a:t>
+            </a:r>
+            <a:endParaRPr lang="fr-FR" dirty="0">
+              <a:solidFill>
+                <a:schemeClr val="tx1"/>
+              </a:solidFill>
+            </a:endParaRPr>
           </a:p>
         </p:txBody>
       </p:sp>
     </p:spTree>
     <p:extLst>
       <p:ext uri="{BB962C8B-B14F-4D97-AF65-F5344CB8AC3E}">
-        <p14:creationId xmlns:p14="http://schemas.microsoft.com/office/powerpoint/2010/main" val="3856758080"/>
+        <p14:creationId xmlns:p14="http://schemas.microsoft.com/office/powerpoint/2010/main" val="1036044005"/>
       </p:ext>
     </p:extLst>
   </p:cSld>
@@ -13671,179 +14797,115 @@
           <a:p>
             <a:r>
               <a:rPr lang="fr-FR" dirty="0" smtClean="0"/>
-              <a:t>Fonctions </a:t>
+              <a:t>ESP32 C3 mini</a:t>
             </a:r>
             <a:endParaRPr lang="fr-FR" dirty="0"/>
           </a:p>
         </p:txBody>
       </p:sp>
+      <p:pic>
+        <p:nvPicPr>
+          <p:cNvPr id="1026" name="Picture 2" descr="ESP32 C3 Supermini Pinout - Hardware - Arduino Forum"/>
+          <p:cNvPicPr>
+            <a:picLocks noChangeAspect="1" noChangeArrowheads="1"/>
+          </p:cNvPicPr>
+          <p:nvPr/>
+        </p:nvPicPr>
+        <p:blipFill>
+          <a:blip r:embed="rId2">
+            <a:extLst>
+              <a:ext uri="{28A0092B-C50C-407E-A947-70E740481C1C}">
+                <a14:useLocalDpi xmlns:a14="http://schemas.microsoft.com/office/drawing/2010/main" val="0"/>
+              </a:ext>
+            </a:extLst>
+          </a:blip>
+          <a:srcRect/>
+          <a:stretch>
+            <a:fillRect/>
+          </a:stretch>
+        </p:blipFill>
+        <p:spPr bwMode="auto">
+          <a:xfrm>
+            <a:off x="1704289" y="2302474"/>
+            <a:ext cx="9219086" cy="4021659"/>
+          </a:xfrm>
+          <a:prstGeom prst="rect">
+            <a:avLst/>
+          </a:prstGeom>
+          <a:noFill/>
+          <a:extLst>
+            <a:ext uri="{909E8E84-426E-40DD-AFC4-6F175D3DCCD1}">
+              <a14:hiddenFill xmlns:a14="http://schemas.microsoft.com/office/drawing/2010/main">
+                <a:solidFill>
+                  <a:srgbClr val="FFFFFF"/>
+                </a:solidFill>
+              </a14:hiddenFill>
+            </a:ext>
+          </a:extLst>
+        </p:spPr>
+      </p:pic>
       <p:sp>
         <p:nvSpPr>
-          <p:cNvPr id="3" name="Espace réservé du contenu 2"/>
-          <p:cNvSpPr>
-            <a:spLocks noGrp="1"/>
-          </p:cNvSpPr>
-          <p:nvPr>
-            <p:ph idx="1"/>
-          </p:nvPr>
+          <p:cNvPr id="5" name="Rectangle à coins arrondis 4"/>
+          <p:cNvSpPr/>
+          <p:nvPr/>
         </p:nvSpPr>
-        <p:spPr/>
+        <p:spPr>
+          <a:xfrm>
+            <a:off x="477794" y="3797645"/>
+            <a:ext cx="1573428" cy="486032"/>
+          </a:xfrm>
+          <a:prstGeom prst="wedgeRoundRectCallout">
+            <a:avLst>
+              <a:gd name="adj1" fmla="val 82467"/>
+              <a:gd name="adj2" fmla="val -10377"/>
+              <a:gd name="adj3" fmla="val 16667"/>
+            </a:avLst>
+          </a:prstGeom>
+          <a:solidFill>
+            <a:srgbClr val="FFFF00"/>
+          </a:solidFill>
+        </p:spPr>
+        <p:style>
+          <a:lnRef idx="2">
+            <a:schemeClr val="accent1">
+              <a:shade val="50000"/>
+            </a:schemeClr>
+          </a:lnRef>
+          <a:fillRef idx="1">
+            <a:schemeClr val="accent1"/>
+          </a:fillRef>
+          <a:effectRef idx="0">
+            <a:schemeClr val="accent1"/>
+          </a:effectRef>
+          <a:fontRef idx="minor">
+            <a:schemeClr val="lt1"/>
+          </a:fontRef>
+        </p:style>
         <p:txBody>
-          <a:bodyPr/>
+          <a:bodyPr rtlCol="0" anchor="ctr"/>
           <a:lstStyle/>
           <a:p>
-            <a:endParaRPr lang="fr-FR"/>
+            <a:r>
+              <a:rPr lang="fr-FR" dirty="0" smtClean="0">
+                <a:solidFill>
+                  <a:schemeClr val="tx1"/>
+                </a:solidFill>
+              </a:rPr>
+              <a:t>LED interne</a:t>
+            </a:r>
+            <a:endParaRPr lang="fr-FR" dirty="0">
+              <a:solidFill>
+                <a:schemeClr val="tx1"/>
+              </a:solidFill>
+            </a:endParaRPr>
           </a:p>
         </p:txBody>
       </p:sp>
     </p:spTree>
     <p:extLst>
       <p:ext uri="{BB962C8B-B14F-4D97-AF65-F5344CB8AC3E}">
-        <p14:creationId xmlns:p14="http://schemas.microsoft.com/office/powerpoint/2010/main" val="2712452389"/>
-      </p:ext>
-    </p:extLst>
-  </p:cSld>
-  <p:clrMapOvr>
-    <a:masterClrMapping/>
-  </p:clrMapOvr>
-</p:sld>
-</file>
-
-<file path=ppt/slides/slide15.xml><?xml version="1.0" encoding="utf-8"?>
-<p:sld xmlns:a="http://schemas.openxmlformats.org/drawingml/2006/main" xmlns:r="http://schemas.openxmlformats.org/officeDocument/2006/relationships" xmlns:p="http://schemas.openxmlformats.org/presentationml/2006/main">
-  <p:cSld>
-    <p:spTree>
-      <p:nvGrpSpPr>
-        <p:cNvPr id="1" name=""/>
-        <p:cNvGrpSpPr/>
-        <p:nvPr/>
-      </p:nvGrpSpPr>
-      <p:grpSpPr>
-        <a:xfrm>
-          <a:off x="0" y="0"/>
-          <a:ext cx="0" cy="0"/>
-          <a:chOff x="0" y="0"/>
-          <a:chExt cx="0" cy="0"/>
-        </a:xfrm>
-      </p:grpSpPr>
-      <p:sp>
-        <p:nvSpPr>
-          <p:cNvPr id="2" name="Titre 1"/>
-          <p:cNvSpPr>
-            <a:spLocks noGrp="1"/>
-          </p:cNvSpPr>
-          <p:nvPr>
-            <p:ph type="title"/>
-          </p:nvPr>
-        </p:nvSpPr>
-        <p:spPr/>
-        <p:txBody>
-          <a:bodyPr/>
-          <a:lstStyle/>
-          <a:p>
-            <a:r>
-              <a:rPr lang="fr-FR" dirty="0" smtClean="0"/>
-              <a:t>Structures logiques et de décision</a:t>
-            </a:r>
-            <a:endParaRPr lang="fr-FR" dirty="0"/>
-          </a:p>
-        </p:txBody>
-      </p:sp>
-      <p:sp>
-        <p:nvSpPr>
-          <p:cNvPr id="3" name="Espace réservé du contenu 2"/>
-          <p:cNvSpPr>
-            <a:spLocks noGrp="1"/>
-          </p:cNvSpPr>
-          <p:nvPr>
-            <p:ph idx="1"/>
-          </p:nvPr>
-        </p:nvSpPr>
-        <p:spPr/>
-        <p:txBody>
-          <a:bodyPr/>
-          <a:lstStyle/>
-          <a:p>
-            <a:endParaRPr lang="fr-FR"/>
-          </a:p>
-        </p:txBody>
-      </p:sp>
-    </p:spTree>
-    <p:extLst>
-      <p:ext uri="{BB962C8B-B14F-4D97-AF65-F5344CB8AC3E}">
-        <p14:creationId xmlns:p14="http://schemas.microsoft.com/office/powerpoint/2010/main" val="3754623010"/>
-      </p:ext>
-    </p:extLst>
-  </p:cSld>
-  <p:clrMapOvr>
-    <a:masterClrMapping/>
-  </p:clrMapOvr>
-</p:sld>
-</file>
-
-<file path=ppt/slides/slide16.xml><?xml version="1.0" encoding="utf-8"?>
-<p:sld xmlns:a="http://schemas.openxmlformats.org/drawingml/2006/main" xmlns:r="http://schemas.openxmlformats.org/officeDocument/2006/relationships" xmlns:p="http://schemas.openxmlformats.org/presentationml/2006/main">
-  <p:cSld>
-    <p:spTree>
-      <p:nvGrpSpPr>
-        <p:cNvPr id="1" name=""/>
-        <p:cNvGrpSpPr/>
-        <p:nvPr/>
-      </p:nvGrpSpPr>
-      <p:grpSpPr>
-        <a:xfrm>
-          <a:off x="0" y="0"/>
-          <a:ext cx="0" cy="0"/>
-          <a:chOff x="0" y="0"/>
-          <a:chExt cx="0" cy="0"/>
-        </a:xfrm>
-      </p:grpSpPr>
-      <p:sp>
-        <p:nvSpPr>
-          <p:cNvPr id="2" name="Titre 1"/>
-          <p:cNvSpPr>
-            <a:spLocks noGrp="1"/>
-          </p:cNvSpPr>
-          <p:nvPr>
-            <p:ph type="title"/>
-          </p:nvPr>
-        </p:nvSpPr>
-        <p:spPr/>
-        <p:txBody>
-          <a:bodyPr/>
-          <a:lstStyle/>
-          <a:p>
-            <a:r>
-              <a:rPr lang="fr-FR" dirty="0" smtClean="0"/>
-              <a:t>Structures organisationnelles</a:t>
-            </a:r>
-            <a:endParaRPr lang="fr-FR" dirty="0"/>
-          </a:p>
-        </p:txBody>
-      </p:sp>
-      <p:sp>
-        <p:nvSpPr>
-          <p:cNvPr id="3" name="Espace réservé du contenu 2"/>
-          <p:cNvSpPr>
-            <a:spLocks noGrp="1"/>
-          </p:cNvSpPr>
-          <p:nvPr>
-            <p:ph idx="1"/>
-          </p:nvPr>
-        </p:nvSpPr>
-        <p:spPr/>
-        <p:txBody>
-          <a:bodyPr/>
-          <a:lstStyle/>
-          <a:p>
-            <a:endParaRPr lang="fr-FR" dirty="0"/>
-          </a:p>
-        </p:txBody>
-      </p:sp>
-    </p:spTree>
-    <p:extLst>
-      <p:ext uri="{BB962C8B-B14F-4D97-AF65-F5344CB8AC3E}">
-        <p14:creationId xmlns:p14="http://schemas.microsoft.com/office/powerpoint/2010/main" val="69859549"/>
+        <p14:creationId xmlns:p14="http://schemas.microsoft.com/office/powerpoint/2010/main" val="2094421856"/>
       </p:ext>
     </p:extLst>
   </p:cSld>
@@ -14837,11 +15899,7 @@
           <a:p>
             <a:r>
               <a:rPr lang="fr-FR" dirty="0" smtClean="0"/>
-              <a:t>Une section de code en double est toujours en trop =&gt; créez des </a:t>
-            </a:r>
-            <a:r>
-              <a:rPr lang="fr-FR" dirty="0" smtClean="0"/>
-              <a:t>fonctions</a:t>
+              <a:t>Une section de code en double est toujours en trop =&gt; créez des fonctions</a:t>
             </a:r>
           </a:p>
           <a:p>
@@ -14885,7 +15943,6 @@
               <a:rPr lang="fr-FR" dirty="0" smtClean="0"/>
               <a:t>Un commentaire sert à expliquer pourquoi on a choisi tel ou tel algorithme.</a:t>
             </a:r>
-            <a:endParaRPr lang="fr-FR" dirty="0" smtClean="0"/>
           </a:p>
           <a:p>
             <a:endParaRPr lang="fr-FR" dirty="0"/>

</xml_diff>